<commit_message>
[add file,system] add doublebuffering concept,add buffer.h(c) 2020-10-22
</commit_message>
<xml_diff>
--- a/TETRIS_NEW_S/Plan.pptx
+++ b/TETRIS_NEW_S/Plan.pptx
@@ -110,7 +110,7 @@
   </p:defaultTextStyle>
   <p:extLst>
     <p:ext uri="{EFAFB233-063F-42B5-8137-9DF3F51BA10A}">
-      <p15:sldGuideLst xmlns:p15="http://schemas.microsoft.com/office/powerpoint/2012/main" xmlns="">
+      <p15:sldGuideLst xmlns:p15="http://schemas.microsoft.com/office/powerpoint/2012/main">
         <p15:guide id="1" orient="horz" pos="3401">
           <p15:clr>
             <a:srgbClr val="A4A3A4"/>
@@ -2995,7 +2995,7 @@
           <p:nvPr>
             <p:extLst>
               <p:ext uri="{D42A27DB-BD31-4B8C-83A1-F6EECF244321}">
-                <p14:modId xmlns:p14="http://schemas.microsoft.com/office/powerpoint/2010/main" val="1254904321"/>
+                <p14:modId xmlns:p14="http://schemas.microsoft.com/office/powerpoint/2010/main" val="2631861142"/>
               </p:ext>
             </p:extLst>
           </p:nvPr>
@@ -3014,14 +3014,14 @@
                 <a:gridCol w="5558973">
                   <a:extLst>
                     <a:ext uri="{9D8B030D-6E8A-4147-A177-3AD203B41FA5}">
-                      <a16:colId xmlns:a16="http://schemas.microsoft.com/office/drawing/2014/main" xmlns="" val="20000"/>
+                      <a16:colId xmlns:a16="http://schemas.microsoft.com/office/drawing/2014/main" val="20000"/>
                     </a:ext>
                   </a:extLst>
                 </a:gridCol>
                 <a:gridCol w="5240791">
                   <a:extLst>
                     <a:ext uri="{9D8B030D-6E8A-4147-A177-3AD203B41FA5}">
-                      <a16:colId xmlns:a16="http://schemas.microsoft.com/office/drawing/2014/main" xmlns="" val="20001"/>
+                      <a16:colId xmlns:a16="http://schemas.microsoft.com/office/drawing/2014/main" val="20001"/>
                     </a:ext>
                   </a:extLst>
                 </a:gridCol>
@@ -3151,7 +3151,7 @@
                 </a:tc>
                 <a:extLst>
                   <a:ext uri="{0D108BD9-81ED-4DB2-BD59-A6C34878D82A}">
-                    <a16:rowId xmlns:a16="http://schemas.microsoft.com/office/drawing/2014/main" xmlns="" val="10000"/>
+                    <a16:rowId xmlns:a16="http://schemas.microsoft.com/office/drawing/2014/main" val="10000"/>
                   </a:ext>
                 </a:extLst>
               </a:tr>
@@ -3263,13 +3263,126 @@
                         <a:rPr lang="ko-KR" altLang="en-US" dirty="0"/>
                         <a:t>라이브러리 구현</a:t>
                       </a:r>
+                      <a:endParaRPr lang="en-US" altLang="ko-KR" dirty="0"/>
+                    </a:p>
+                    <a:p>
+                      <a:pPr latinLnBrk="1"/>
+                      <a:endParaRPr lang="en-US" altLang="ko-KR" dirty="0"/>
+                    </a:p>
+                    <a:p>
+                      <a:pPr latinLnBrk="1"/>
+                      <a:r>
+                        <a:rPr lang="en-US" altLang="ko-KR" dirty="0"/>
+                        <a:t>2:</a:t>
+                      </a:r>
+                      <a:r>
+                        <a:rPr lang="ko-KR" altLang="en-US" dirty="0" err="1"/>
+                        <a:t>이중버퍼링</a:t>
+                      </a:r>
+                      <a:r>
+                        <a:rPr lang="ko-KR" altLang="en-US" dirty="0"/>
+                        <a:t> 시스템 구현</a:t>
+                      </a:r>
+                      <a:endParaRPr lang="en-US" altLang="ko-KR" dirty="0"/>
+                    </a:p>
+                    <a:p>
+                      <a:pPr latinLnBrk="1"/>
+                      <a:r>
+                        <a:rPr lang="en-US" altLang="ko-KR" dirty="0"/>
+                        <a:t>//</a:t>
+                      </a:r>
+                      <a:r>
+                        <a:rPr lang="ko-KR" altLang="en-US" dirty="0"/>
+                        <a:t>버퍼 배열</a:t>
+                      </a:r>
+                      <a:r>
+                        <a:rPr lang="en-US" altLang="ko-KR" dirty="0"/>
+                        <a:t> </a:t>
+                      </a:r>
+                      <a:r>
+                        <a:rPr lang="ko-KR" altLang="en-US" dirty="0"/>
+                        <a:t>참조</a:t>
+                      </a:r>
+                      <a:r>
+                        <a:rPr lang="en-US" altLang="ko-KR" dirty="0"/>
+                        <a:t>,</a:t>
+                      </a:r>
+                      <a:r>
+                        <a:rPr lang="ko-KR" altLang="en-US" dirty="0"/>
+                        <a:t>실제 버퍼에 입력</a:t>
+                      </a:r>
+                      <a:endParaRPr lang="en-US" altLang="ko-KR" dirty="0"/>
+                    </a:p>
+                    <a:p>
+                      <a:pPr latinLnBrk="1"/>
+                      <a:r>
+                        <a:rPr lang="en-US" altLang="ko-KR" dirty="0"/>
+                        <a:t>//</a:t>
+                      </a:r>
+                      <a:r>
+                        <a:rPr lang="ko-KR" altLang="en-US" dirty="0"/>
+                        <a:t>스크린 버퍼와 버퍼 배열</a:t>
+                      </a:r>
+                      <a:r>
+                        <a:rPr lang="en-US" altLang="ko-KR" dirty="0"/>
+                        <a:t>,</a:t>
+                      </a:r>
+                      <a:r>
+                        <a:rPr lang="ko-KR" altLang="en-US" dirty="0"/>
+                        <a:t>데이터 배열 등 </a:t>
+                      </a:r>
+                      <a:endParaRPr lang="en-US" altLang="ko-KR" dirty="0"/>
+                    </a:p>
+                    <a:p>
+                      <a:pPr latinLnBrk="1"/>
+                      <a:r>
+                        <a:rPr lang="en-US" altLang="ko-KR" dirty="0"/>
+                        <a:t>//</a:t>
+                      </a:r>
+                      <a:r>
+                        <a:rPr lang="ko-KR" altLang="en-US" dirty="0"/>
+                        <a:t>자료구조 </a:t>
+                      </a:r>
+                      <a:r>
+                        <a:rPr lang="ko-KR" altLang="en-US" dirty="0" err="1"/>
+                        <a:t>리팩토링</a:t>
+                      </a:r>
+                      <a:endParaRPr lang="en-US" altLang="ko-KR" dirty="0"/>
+                    </a:p>
+                    <a:p>
+                      <a:pPr latinLnBrk="1"/>
+                      <a:r>
+                        <a:rPr lang="en-US" altLang="ko-KR" dirty="0"/>
+                        <a:t>  (1):</a:t>
+                      </a:r>
+                      <a:r>
+                        <a:rPr lang="en-US" altLang="ko-KR" dirty="0" err="1"/>
+                        <a:t>buffer.h</a:t>
+                      </a:r>
+                      <a:r>
+                        <a:rPr lang="en-US" altLang="ko-KR" dirty="0"/>
+                        <a:t> </a:t>
+                      </a:r>
+                      <a:r>
+                        <a:rPr lang="ko-KR" altLang="en-US" dirty="0"/>
+                        <a:t>구현 </a:t>
+                      </a:r>
+                      <a:r>
+                        <a:rPr lang="en-US" altLang="ko-KR" dirty="0"/>
+                        <a:t>//</a:t>
+                      </a:r>
+                      <a:r>
+                        <a:rPr lang="ko-KR" altLang="en-US" sz="1600" dirty="0"/>
+                        <a:t>버퍼 배열과 스크린 버퍼 동기화</a:t>
+                      </a:r>
+                      <a:endParaRPr lang="en-US" altLang="ko-KR" dirty="0"/>
                     </a:p>
                   </a:txBody>
                   <a:tcPr/>
                 </a:tc>
                 <a:extLst>
                   <a:ext uri="{0D108BD9-81ED-4DB2-BD59-A6C34878D82A}">
-                    <a16:rowId xmlns:a16="http://schemas.microsoft.com/office/drawing/2014/main" xmlns="" val="10001"/>
+                    <a16:rowId xmlns:a16="http://schemas.microsoft.com/office/drawing/2014/main" val="10001"/>
                   </a:ext>
                 </a:extLst>
               </a:tr>
@@ -3312,7 +3425,7 @@
           <p:cNvPr id="1026" name="Picture 2" descr="게임제작개론 : #6 게임 시스템 구조에 대한 이해">
             <a:extLst>
               <a:ext uri="{FF2B5EF4-FFF2-40B4-BE49-F238E27FC236}">
-                <a16:creationId xmlns:a16="http://schemas.microsoft.com/office/drawing/2014/main" xmlns="" id="{5AA2E3DF-9B1B-42F8-87D8-4867D943D1DD}"/>
+                <a16:creationId xmlns:a16="http://schemas.microsoft.com/office/drawing/2014/main" id="{5AA2E3DF-9B1B-42F8-87D8-4867D943D1DD}"/>
               </a:ext>
             </a:extLst>
           </p:cNvPr>
@@ -3405,7 +3518,7 @@
           <a:lstStyle/>
           <a:p>
             <a:r>
-              <a:rPr lang="en-US" altLang="ko-KR" dirty="0" smtClean="0"/>
+              <a:rPr lang="en-US" altLang="ko-KR" dirty="0"/>
               <a:t>CHEAT SHEET</a:t>
             </a:r>
             <a:endParaRPr lang="ko-KR" altLang="en-US" dirty="0"/>
@@ -3455,7 +3568,7 @@
               <a:t>형 변수에 </a:t>
             </a:r>
             <a:r>
-              <a:rPr lang="ko-KR" altLang="en-US" dirty="0" err="1" smtClean="0">
+              <a:rPr lang="ko-KR" altLang="en-US" dirty="0" err="1">
                 <a:solidFill>
                   <a:schemeClr val="accent6"/>
                 </a:solidFill>
@@ -3465,36 +3578,26 @@
               <a:t>리턴값을</a:t>
             </a:r>
             <a:r>
-              <a:rPr lang="ko-KR" altLang="en-US" dirty="0" smtClean="0">
+              <a:rPr lang="ko-KR" altLang="en-US" dirty="0">
                 <a:solidFill>
                   <a:schemeClr val="accent6"/>
                 </a:solidFill>
                 <a:latin typeface="돋움체"/>
                 <a:ea typeface="돋움체"/>
               </a:rPr>
-              <a:t> 넘겨서 </a:t>
-            </a:r>
-            <a:r>
-              <a:rPr lang="ko-KR" altLang="en-US" dirty="0">
+              <a:t> 넘겨서 스크린 버퍼 핸들로 만들어준다</a:t>
+            </a:r>
+            <a:r>
+              <a:rPr lang="en-US" altLang="ko-KR" dirty="0">
                 <a:solidFill>
                   <a:schemeClr val="accent6"/>
                 </a:solidFill>
                 <a:latin typeface="돋움체"/>
                 <a:ea typeface="돋움체"/>
               </a:rPr>
-              <a:t>스크린 버퍼 핸들로 만들어준다</a:t>
-            </a:r>
-            <a:r>
-              <a:rPr lang="en-US" altLang="ko-KR" dirty="0" smtClean="0">
-                <a:solidFill>
-                  <a:schemeClr val="accent6"/>
-                </a:solidFill>
-                <a:latin typeface="돋움체"/>
-                <a:ea typeface="돋움체"/>
-              </a:rPr>
               <a:t>.</a:t>
             </a:r>
-            <a:endParaRPr lang="en-US" altLang="ko-KR" dirty="0" smtClean="0">
+            <a:endParaRPr lang="en-US" altLang="ko-KR" dirty="0">
               <a:solidFill>
                 <a:srgbClr val="FF0000"/>
               </a:solidFill>
@@ -3504,7 +3607,7 @@
           </a:p>
           <a:p>
             <a:r>
-              <a:rPr lang="en-US" altLang="ko-KR" dirty="0" smtClean="0">
+              <a:rPr lang="en-US" altLang="ko-KR" dirty="0">
                 <a:solidFill>
                   <a:srgbClr val="FF0000"/>
                 </a:solidFill>
@@ -3514,7 +3617,7 @@
               <a:t>CreateConsoleScreenBuffer</a:t>
             </a:r>
             <a:r>
-              <a:rPr lang="en-US" altLang="ko-KR" dirty="0" smtClean="0">
+              <a:rPr lang="en-US" altLang="ko-KR" dirty="0">
                 <a:solidFill>
                   <a:srgbClr val="000000"/>
                 </a:solidFill>
@@ -3526,7 +3629,7 @@
           </a:p>
           <a:p>
             <a:r>
-              <a:rPr lang="en-US" altLang="ko-KR" dirty="0" smtClean="0">
+              <a:rPr lang="en-US" altLang="ko-KR" dirty="0">
                 <a:solidFill>
                   <a:srgbClr val="000000"/>
                 </a:solidFill>
@@ -3536,24 +3639,14 @@
               <a:t>    </a:t>
             </a:r>
             <a:r>
-              <a:rPr lang="en-US" altLang="ko-KR" dirty="0" smtClean="0">
+              <a:rPr lang="en-US" altLang="ko-KR" dirty="0">
                 <a:solidFill>
                   <a:srgbClr val="6F008A"/>
                 </a:solidFill>
                 <a:latin typeface="돋움체"/>
                 <a:ea typeface="돋움체"/>
               </a:rPr>
-              <a:t>_</a:t>
-            </a:r>
-            <a:r>
-              <a:rPr lang="en-US" altLang="ko-KR" dirty="0">
-                <a:solidFill>
-                  <a:srgbClr val="6F008A"/>
-                </a:solidFill>
-                <a:latin typeface="돋움체"/>
-                <a:ea typeface="돋움체"/>
-              </a:rPr>
-              <a:t>In_</a:t>
+              <a:t>_In_</a:t>
             </a:r>
             <a:r>
               <a:rPr lang="en-US" altLang="ko-KR" dirty="0">
@@ -3596,27 +3689,17 @@
               <a:t>dwDesiredAccess</a:t>
             </a:r>
             <a:r>
-              <a:rPr lang="en-US" altLang="ko-KR" dirty="0" smtClean="0">
-                <a:solidFill>
-                  <a:srgbClr val="000000"/>
-                </a:solidFill>
-                <a:latin typeface="돋움체"/>
-                <a:ea typeface="돋움체"/>
-              </a:rPr>
-              <a:t>,  </a:t>
-            </a:r>
-            <a:r>
-              <a:rPr lang="en-US" altLang="ko-KR" dirty="0">
-                <a:solidFill>
-                  <a:srgbClr val="000000"/>
-                </a:solidFill>
-                <a:latin typeface="돋움체"/>
-                <a:ea typeface="돋움체"/>
-              </a:rPr>
-              <a:t>	</a:t>
-            </a:r>
-            <a:r>
-              <a:rPr lang="en-US" altLang="ko-KR" dirty="0" smtClean="0">
+              <a:rPr lang="en-US" altLang="ko-KR" dirty="0">
+                <a:solidFill>
+                  <a:srgbClr val="000000"/>
+                </a:solidFill>
+                <a:latin typeface="돋움체"/>
+                <a:ea typeface="돋움체"/>
+              </a:rPr>
+              <a:t>,  	</a:t>
+            </a:r>
+            <a:r>
+              <a:rPr lang="en-US" altLang="ko-KR" dirty="0">
                 <a:solidFill>
                   <a:schemeClr val="accent6"/>
                 </a:solidFill>
@@ -3626,7 +3709,7 @@
               <a:t>//GENERIC_READ | GENERIC_WRITE </a:t>
             </a:r>
             <a:r>
-              <a:rPr lang="ko-KR" altLang="en-US" dirty="0" smtClean="0">
+              <a:rPr lang="ko-KR" altLang="en-US" dirty="0">
                 <a:solidFill>
                   <a:schemeClr val="accent6"/>
                 </a:solidFill>
@@ -3705,7 +3788,7 @@
               <a:t>dwShareMode</a:t>
             </a:r>
             <a:r>
-              <a:rPr lang="en-US" altLang="ko-KR" dirty="0" smtClean="0">
+              <a:rPr lang="en-US" altLang="ko-KR" dirty="0">
                 <a:solidFill>
                   <a:srgbClr val="000000"/>
                 </a:solidFill>
@@ -3715,7 +3798,7 @@
               <a:t>,	 	</a:t>
             </a:r>
             <a:r>
-              <a:rPr lang="en-US" altLang="ko-KR" dirty="0" smtClean="0">
+              <a:rPr lang="en-US" altLang="ko-KR" dirty="0">
                 <a:solidFill>
                   <a:schemeClr val="accent6"/>
                 </a:solidFill>
@@ -3977,7 +4060,7 @@
               <a:t>    </a:t>
             </a:r>
             <a:r>
-              <a:rPr lang="en-US" altLang="ko-KR" dirty="0" smtClean="0">
+              <a:rPr lang="en-US" altLang="ko-KR" dirty="0">
                 <a:solidFill>
                   <a:srgbClr val="000000"/>
                 </a:solidFill>
@@ -4171,7 +4254,7 @@
               <a:t>    </a:t>
             </a:r>
             <a:r>
-              <a:rPr lang="en-US" altLang="ko-KR" dirty="0" smtClean="0">
+              <a:rPr lang="en-US" altLang="ko-KR" dirty="0">
                 <a:solidFill>
                   <a:srgbClr val="000000"/>
                 </a:solidFill>
@@ -4601,7 +4684,7 @@
               <a:t>    </a:t>
             </a:r>
             <a:r>
-              <a:rPr lang="en-US" altLang="ko-KR" dirty="0" smtClean="0">
+              <a:rPr lang="en-US" altLang="ko-KR" dirty="0">
                 <a:solidFill>
                   <a:srgbClr val="000000"/>
                 </a:solidFill>
@@ -4744,7 +4827,7 @@
           </a:p>
           <a:p>
             <a:r>
-              <a:rPr lang="en-US" altLang="ko-KR" dirty="0" smtClean="0">
+              <a:rPr lang="en-US" altLang="ko-KR" dirty="0">
                 <a:solidFill>
                   <a:srgbClr val="000000"/>
                 </a:solidFill>
@@ -4756,7 +4839,7 @@
           </a:p>
           <a:p>
             <a:r>
-              <a:rPr lang="en-US" altLang="ko-KR" dirty="0" smtClean="0">
+              <a:rPr lang="en-US" altLang="ko-KR" dirty="0">
                 <a:solidFill>
                   <a:srgbClr val="000000"/>
                 </a:solidFill>
@@ -4766,7 +4849,7 @@
               <a:t>Static HANDLE buffer[2]; </a:t>
             </a:r>
             <a:r>
-              <a:rPr lang="en-US" altLang="ko-KR" dirty="0" smtClean="0">
+              <a:rPr lang="en-US" altLang="ko-KR" dirty="0">
                 <a:solidFill>
                   <a:schemeClr val="accent6"/>
                 </a:solidFill>
@@ -4786,22 +4869,12 @@
                 <a:latin typeface="돋움체"/>
                 <a:ea typeface="돋움체"/>
               </a:rPr>
-              <a:t>DWORD dw; //unsigned </a:t>
-            </a:r>
-            <a:r>
-              <a:rPr lang="en-US" altLang="ko-KR" dirty="0" smtClean="0">
-                <a:solidFill>
-                  <a:srgbClr val="000000"/>
-                </a:solidFill>
-                <a:latin typeface="돋움체"/>
-                <a:ea typeface="돋움체"/>
-              </a:rPr>
-              <a:t>long</a:t>
-            </a:r>
-          </a:p>
-          <a:p>
-            <a:r>
-              <a:rPr lang="en-US" altLang="ko-KR" dirty="0" smtClean="0">
+              <a:t>DWORD dw; //unsigned long</a:t>
+            </a:r>
+          </a:p>
+          <a:p>
+            <a:r>
+              <a:rPr lang="en-US" altLang="ko-KR" dirty="0">
                 <a:solidFill>
                   <a:srgbClr val="000000"/>
                 </a:solidFill>
@@ -4813,7 +4886,7 @@
           </a:p>
           <a:p>
             <a:r>
-              <a:rPr lang="en-US" altLang="ko-KR" dirty="0" smtClean="0">
+              <a:rPr lang="en-US" altLang="ko-KR" dirty="0">
                 <a:solidFill>
                   <a:srgbClr val="FF0000"/>
                 </a:solidFill>
@@ -4823,7 +4896,7 @@
               <a:t>CreateConsoleScreenBuffer</a:t>
             </a:r>
             <a:r>
-              <a:rPr lang="en-US" altLang="ko-KR" dirty="0" smtClean="0">
+              <a:rPr lang="en-US" altLang="ko-KR" dirty="0">
                 <a:solidFill>
                   <a:srgbClr val="000000"/>
                 </a:solidFill>
@@ -4835,7 +4908,7 @@
           </a:p>
           <a:p>
             <a:r>
-              <a:rPr lang="en-US" altLang="ko-KR" dirty="0" smtClean="0">
+              <a:rPr lang="en-US" altLang="ko-KR" dirty="0">
                 <a:solidFill>
                   <a:srgbClr val="000000"/>
                 </a:solidFill>
@@ -4844,6 +4917,106 @@
               </a:rPr>
               <a:t>buffer[1]=</a:t>
             </a:r>
+          </a:p>
+          <a:p>
+            <a:r>
+              <a:rPr lang="en-US" altLang="ko-KR" dirty="0">
+                <a:solidFill>
+                  <a:srgbClr val="FF0000"/>
+                </a:solidFill>
+                <a:latin typeface="돋움체"/>
+                <a:ea typeface="돋움체"/>
+              </a:rPr>
+              <a:t>CreateConsoleScreenBuffer</a:t>
+            </a:r>
+            <a:r>
+              <a:rPr lang="en-US" altLang="ko-KR" dirty="0">
+                <a:solidFill>
+                  <a:srgbClr val="000000"/>
+                </a:solidFill>
+                <a:latin typeface="돋움체"/>
+                <a:ea typeface="돋움체"/>
+              </a:rPr>
+              <a:t>(GENERIC_READ|GENERIC_WRITE,0,NULL,CONSOLE_TEXTMODE_BUFFER,NULL); COORD CursorPosition = { 0 , 0 }; </a:t>
+            </a:r>
+            <a:r>
+              <a:rPr lang="en-US" altLang="ko-KR" dirty="0">
+                <a:solidFill>
+                  <a:schemeClr val="accent6"/>
+                </a:solidFill>
+                <a:latin typeface="돋움체"/>
+                <a:ea typeface="돋움체"/>
+              </a:rPr>
+              <a:t>// CursorPosition (var name) =  { x , y}</a:t>
+            </a:r>
+          </a:p>
+          <a:p>
+            <a:r>
+              <a:rPr lang="en-US" altLang="ko-KR" dirty="0">
+                <a:solidFill>
+                  <a:srgbClr val="0070C0"/>
+                </a:solidFill>
+                <a:latin typeface="돋움체"/>
+                <a:ea typeface="돋움체"/>
+              </a:rPr>
+              <a:t>SetConsoleCursorPosition</a:t>
+            </a:r>
+            <a:r>
+              <a:rPr lang="en-US" altLang="ko-KR" dirty="0">
+                <a:solidFill>
+                  <a:srgbClr val="000000"/>
+                </a:solidFill>
+                <a:latin typeface="돋움체"/>
+                <a:ea typeface="돋움체"/>
+              </a:rPr>
+              <a:t>(buffer[0],CursorPosition);</a:t>
+            </a:r>
+          </a:p>
+          <a:p>
+            <a:r>
+              <a:rPr lang="en-US" altLang="ko-KR" dirty="0">
+                <a:solidFill>
+                  <a:schemeClr val="accent4"/>
+                </a:solidFill>
+                <a:latin typeface="돋움체"/>
+                <a:ea typeface="돋움체"/>
+              </a:rPr>
+              <a:t>WriteFile</a:t>
+            </a:r>
+            <a:r>
+              <a:rPr lang="en-US" altLang="ko-KR" dirty="0">
+                <a:solidFill>
+                  <a:srgbClr val="000000"/>
+                </a:solidFill>
+                <a:latin typeface="돋움체"/>
+                <a:ea typeface="돋움체"/>
+              </a:rPr>
+              <a:t>(buffer[0],”Hello,World!”,strlen(“Hello,World!”),&amp;dw,NULL);</a:t>
+            </a:r>
+          </a:p>
+          <a:p>
+            <a:r>
+              <a:rPr lang="en-US" altLang="ko-KR" dirty="0">
+                <a:solidFill>
+                  <a:srgbClr val="E85BFF"/>
+                </a:solidFill>
+                <a:latin typeface="돋움체"/>
+                <a:ea typeface="돋움체"/>
+              </a:rPr>
+              <a:t>SetConsoleActiveScreenBuffer</a:t>
+            </a:r>
+            <a:r>
+              <a:rPr lang="en-US" altLang="ko-KR" dirty="0">
+                <a:solidFill>
+                  <a:srgbClr val="000000"/>
+                </a:solidFill>
+                <a:latin typeface="돋움체"/>
+                <a:ea typeface="돋움체"/>
+              </a:rPr>
+              <a:t>(buffer[0]);</a:t>
+            </a:r>
+          </a:p>
+          <a:p>
             <a:endParaRPr lang="en-US" altLang="ko-KR" dirty="0">
               <a:solidFill>
                 <a:srgbClr val="000000"/>
@@ -4853,144 +5026,7 @@
             </a:endParaRPr>
           </a:p>
           <a:p>
-            <a:r>
-              <a:rPr lang="en-US" altLang="ko-KR" dirty="0">
-                <a:solidFill>
-                  <a:srgbClr val="FF0000"/>
-                </a:solidFill>
-                <a:latin typeface="돋움체"/>
-                <a:ea typeface="돋움체"/>
-              </a:rPr>
-              <a:t>CreateConsoleScreenBuffer</a:t>
-            </a:r>
-            <a:r>
-              <a:rPr lang="en-US" altLang="ko-KR" dirty="0">
-                <a:solidFill>
-                  <a:srgbClr val="000000"/>
-                </a:solidFill>
-                <a:latin typeface="돋움체"/>
-                <a:ea typeface="돋움체"/>
-              </a:rPr>
-              <a:t>(GENERIC_READ|GENERIC_WRITE,0,NULL,CONSOLE_TEXTMODE_BUFFER,NULL); </a:t>
-            </a:r>
-            <a:r>
-              <a:rPr lang="en-US" altLang="ko-KR" dirty="0" smtClean="0">
-                <a:solidFill>
-                  <a:srgbClr val="000000"/>
-                </a:solidFill>
-                <a:latin typeface="돋움체"/>
-                <a:ea typeface="돋움체"/>
-              </a:rPr>
-              <a:t>COORD </a:t>
-            </a:r>
-            <a:r>
-              <a:rPr lang="en-US" altLang="ko-KR" dirty="0">
-                <a:solidFill>
-                  <a:srgbClr val="000000"/>
-                </a:solidFill>
-                <a:latin typeface="돋움체"/>
-                <a:ea typeface="돋움체"/>
-              </a:rPr>
-              <a:t>CursorPosition = { 0 , 0 }; </a:t>
-            </a:r>
-            <a:r>
-              <a:rPr lang="en-US" altLang="ko-KR" dirty="0">
-                <a:solidFill>
-                  <a:schemeClr val="accent6"/>
-                </a:solidFill>
-                <a:latin typeface="돋움체"/>
-                <a:ea typeface="돋움체"/>
-              </a:rPr>
-              <a:t>// CursorPosition (var name) =  { x , y</a:t>
-            </a:r>
-            <a:r>
-              <a:rPr lang="en-US" altLang="ko-KR" dirty="0" smtClean="0">
-                <a:solidFill>
-                  <a:schemeClr val="accent6"/>
-                </a:solidFill>
-                <a:latin typeface="돋움체"/>
-                <a:ea typeface="돋움체"/>
-              </a:rPr>
-              <a:t>}</a:t>
-            </a:r>
-          </a:p>
-          <a:p>
-            <a:r>
-              <a:rPr lang="en-US" altLang="ko-KR" dirty="0" smtClean="0">
-                <a:solidFill>
-                  <a:srgbClr val="0070C0"/>
-                </a:solidFill>
-                <a:latin typeface="돋움체"/>
-                <a:ea typeface="돋움체"/>
-              </a:rPr>
-              <a:t>SetConsoleCursorPosition</a:t>
-            </a:r>
-            <a:r>
-              <a:rPr lang="en-US" altLang="ko-KR" dirty="0" smtClean="0">
-                <a:solidFill>
-                  <a:srgbClr val="000000"/>
-                </a:solidFill>
-                <a:latin typeface="돋움체"/>
-                <a:ea typeface="돋움체"/>
-              </a:rPr>
-              <a:t>(buffer[0],CursorPosition);</a:t>
-            </a:r>
-          </a:p>
-          <a:p>
-            <a:r>
-              <a:rPr lang="en-US" altLang="ko-KR" dirty="0" smtClean="0">
-                <a:solidFill>
-                  <a:schemeClr val="accent4"/>
-                </a:solidFill>
-                <a:latin typeface="돋움체"/>
-                <a:ea typeface="돋움체"/>
-              </a:rPr>
-              <a:t>WriteFile</a:t>
-            </a:r>
-            <a:r>
-              <a:rPr lang="en-US" altLang="ko-KR" dirty="0" smtClean="0">
-                <a:solidFill>
-                  <a:srgbClr val="000000"/>
-                </a:solidFill>
-                <a:latin typeface="돋움체"/>
-                <a:ea typeface="돋움체"/>
-              </a:rPr>
-              <a:t>(buffer[0],”Hello,World!”,strlen(“Hello,World!”),&amp;dw,NULL);</a:t>
-            </a:r>
-          </a:p>
-          <a:p>
-            <a:r>
-              <a:rPr lang="en-US" altLang="ko-KR" dirty="0" smtClean="0">
-                <a:solidFill>
-                  <a:srgbClr val="E85BFF"/>
-                </a:solidFill>
-                <a:latin typeface="돋움체"/>
-                <a:ea typeface="돋움체"/>
-              </a:rPr>
-              <a:t>SetConsoleActiveScreenBuffer</a:t>
-            </a:r>
-            <a:r>
-              <a:rPr lang="en-US" altLang="ko-KR" dirty="0" smtClean="0">
-                <a:solidFill>
-                  <a:srgbClr val="000000"/>
-                </a:solidFill>
-                <a:latin typeface="돋움체"/>
-                <a:ea typeface="돋움체"/>
-              </a:rPr>
-              <a:t>(buffer[0]);</a:t>
-            </a:r>
-          </a:p>
-          <a:p>
-            <a:endParaRPr lang="en-US" altLang="ko-KR" dirty="0" smtClean="0">
-              <a:solidFill>
-                <a:srgbClr val="000000"/>
-              </a:solidFill>
-              <a:latin typeface="돋움체"/>
-              <a:ea typeface="돋움체"/>
-            </a:endParaRPr>
-          </a:p>
-          <a:p>
-            <a:endParaRPr lang="ko-KR" altLang="en-US" dirty="0" smtClean="0"/>
+            <a:endParaRPr lang="ko-KR" altLang="en-US" dirty="0"/>
           </a:p>
           <a:p>
             <a:endParaRPr lang="ko-KR" altLang="en-US" dirty="0"/>
@@ -6688,7 +6724,7 @@
   <a:extraClrSchemeLst/>
   <a:extLst>
     <a:ext uri="{05A4C25C-085E-4340-85A3-A5531E510DB2}">
-      <thm15:themeFamily xmlns:thm15="http://schemas.microsoft.com/office/thememl/2012/main" xmlns="" name="Office Theme" id="{62F939B6-93AF-4DB8-9C6B-D6C7DFDC589F}" vid="{4A3C46E8-61CC-4603-A589-7422A47A8E4A}"/>
+      <thm15:themeFamily xmlns:thm15="http://schemas.microsoft.com/office/thememl/2012/main" name="Office Theme" id="{62F939B6-93AF-4DB8-9C6B-D6C7DFDC589F}" vid="{4A3C46E8-61CC-4603-A589-7422A47A8E4A}"/>
     </a:ext>
   </a:extLst>
 </a:theme>

</xml_diff>

<commit_message>
[save] build start simulation.h(c) 2020-10-23
</commit_message>
<xml_diff>
--- a/TETRIS_NEW_S/Plan.pptx
+++ b/TETRIS_NEW_S/Plan.pptx
@@ -110,7 +110,7 @@
   </p:defaultTextStyle>
   <p:extLst>
     <p:ext uri="{EFAFB233-063F-42B5-8137-9DF3F51BA10A}">
-      <p15:sldGuideLst xmlns:p15="http://schemas.microsoft.com/office/powerpoint/2012/main">
+      <p15:sldGuideLst xmlns:p15="http://schemas.microsoft.com/office/powerpoint/2012/main" xmlns="">
         <p15:guide id="1" orient="horz" pos="3401">
           <p15:clr>
             <a:srgbClr val="A4A3A4"/>
@@ -258,7 +258,7 @@
           <a:p>
             <a:fld id="{7B4AEC64-C389-4369-9319-C0AE625A87B9}" type="datetimeFigureOut">
               <a:rPr lang="ko-KR" altLang="en-US" smtClean="0"/>
-              <a:t>2020-10-22</a:t>
+              <a:t>2020-10-23</a:t>
             </a:fld>
             <a:endParaRPr lang="ko-KR" altLang="en-US" dirty="0"/>
           </a:p>
@@ -428,7 +428,7 @@
           <a:p>
             <a:fld id="{7B4AEC64-C389-4369-9319-C0AE625A87B9}" type="datetimeFigureOut">
               <a:rPr lang="ko-KR" altLang="en-US" smtClean="0"/>
-              <a:t>2020-10-22</a:t>
+              <a:t>2020-10-23</a:t>
             </a:fld>
             <a:endParaRPr lang="ko-KR" altLang="en-US" dirty="0"/>
           </a:p>
@@ -608,7 +608,7 @@
           <a:p>
             <a:fld id="{7B4AEC64-C389-4369-9319-C0AE625A87B9}" type="datetimeFigureOut">
               <a:rPr lang="ko-KR" altLang="en-US" smtClean="0"/>
-              <a:t>2020-10-22</a:t>
+              <a:t>2020-10-23</a:t>
             </a:fld>
             <a:endParaRPr lang="ko-KR" altLang="en-US" dirty="0"/>
           </a:p>
@@ -778,7 +778,7 @@
           <a:p>
             <a:fld id="{7B4AEC64-C389-4369-9319-C0AE625A87B9}" type="datetimeFigureOut">
               <a:rPr lang="ko-KR" altLang="en-US" smtClean="0"/>
-              <a:t>2020-10-22</a:t>
+              <a:t>2020-10-23</a:t>
             </a:fld>
             <a:endParaRPr lang="ko-KR" altLang="en-US" dirty="0"/>
           </a:p>
@@ -1022,7 +1022,7 @@
           <a:p>
             <a:fld id="{7B4AEC64-C389-4369-9319-C0AE625A87B9}" type="datetimeFigureOut">
               <a:rPr lang="ko-KR" altLang="en-US" smtClean="0"/>
-              <a:t>2020-10-22</a:t>
+              <a:t>2020-10-23</a:t>
             </a:fld>
             <a:endParaRPr lang="ko-KR" altLang="en-US" dirty="0"/>
           </a:p>
@@ -1254,7 +1254,7 @@
           <a:p>
             <a:fld id="{7B4AEC64-C389-4369-9319-C0AE625A87B9}" type="datetimeFigureOut">
               <a:rPr lang="ko-KR" altLang="en-US" smtClean="0"/>
-              <a:t>2020-10-22</a:t>
+              <a:t>2020-10-23</a:t>
             </a:fld>
             <a:endParaRPr lang="ko-KR" altLang="en-US" dirty="0"/>
           </a:p>
@@ -1621,7 +1621,7 @@
           <a:p>
             <a:fld id="{7B4AEC64-C389-4369-9319-C0AE625A87B9}" type="datetimeFigureOut">
               <a:rPr lang="ko-KR" altLang="en-US" smtClean="0"/>
-              <a:t>2020-10-22</a:t>
+              <a:t>2020-10-23</a:t>
             </a:fld>
             <a:endParaRPr lang="ko-KR" altLang="en-US" dirty="0"/>
           </a:p>
@@ -1739,7 +1739,7 @@
           <a:p>
             <a:fld id="{7B4AEC64-C389-4369-9319-C0AE625A87B9}" type="datetimeFigureOut">
               <a:rPr lang="ko-KR" altLang="en-US" smtClean="0"/>
-              <a:t>2020-10-22</a:t>
+              <a:t>2020-10-23</a:t>
             </a:fld>
             <a:endParaRPr lang="ko-KR" altLang="en-US" dirty="0"/>
           </a:p>
@@ -1834,7 +1834,7 @@
           <a:p>
             <a:fld id="{7B4AEC64-C389-4369-9319-C0AE625A87B9}" type="datetimeFigureOut">
               <a:rPr lang="ko-KR" altLang="en-US" smtClean="0"/>
-              <a:t>2020-10-22</a:t>
+              <a:t>2020-10-23</a:t>
             </a:fld>
             <a:endParaRPr lang="ko-KR" altLang="en-US" dirty="0"/>
           </a:p>
@@ -2111,7 +2111,7 @@
           <a:p>
             <a:fld id="{7B4AEC64-C389-4369-9319-C0AE625A87B9}" type="datetimeFigureOut">
               <a:rPr lang="ko-KR" altLang="en-US" smtClean="0"/>
-              <a:t>2020-10-22</a:t>
+              <a:t>2020-10-23</a:t>
             </a:fld>
             <a:endParaRPr lang="ko-KR" altLang="en-US" dirty="0"/>
           </a:p>
@@ -2368,7 +2368,7 @@
           <a:p>
             <a:fld id="{7B4AEC64-C389-4369-9319-C0AE625A87B9}" type="datetimeFigureOut">
               <a:rPr lang="ko-KR" altLang="en-US" smtClean="0"/>
-              <a:t>2020-10-22</a:t>
+              <a:t>2020-10-23</a:t>
             </a:fld>
             <a:endParaRPr lang="ko-KR" altLang="en-US" dirty="0"/>
           </a:p>
@@ -2581,7 +2581,7 @@
           <a:p>
             <a:fld id="{7B4AEC64-C389-4369-9319-C0AE625A87B9}" type="datetimeFigureOut">
               <a:rPr lang="ko-KR" altLang="en-US" smtClean="0"/>
-              <a:t>2020-10-22</a:t>
+              <a:t>2020-10-23</a:t>
             </a:fld>
             <a:endParaRPr lang="ko-KR" altLang="en-US" dirty="0"/>
           </a:p>
@@ -2995,7 +2995,7 @@
           <p:nvPr>
             <p:extLst>
               <p:ext uri="{D42A27DB-BD31-4B8C-83A1-F6EECF244321}">
-                <p14:modId xmlns:p14="http://schemas.microsoft.com/office/powerpoint/2010/main" val="2631861142"/>
+                <p14:modId xmlns:p14="http://schemas.microsoft.com/office/powerpoint/2010/main" val="2377611836"/>
               </p:ext>
             </p:extLst>
           </p:nvPr>
@@ -3014,14 +3014,14 @@
                 <a:gridCol w="5558973">
                   <a:extLst>
                     <a:ext uri="{9D8B030D-6E8A-4147-A177-3AD203B41FA5}">
-                      <a16:colId xmlns:a16="http://schemas.microsoft.com/office/drawing/2014/main" val="20000"/>
+                      <a16:colId xmlns:a16="http://schemas.microsoft.com/office/drawing/2014/main" xmlns="" val="20000"/>
                     </a:ext>
                   </a:extLst>
                 </a:gridCol>
                 <a:gridCol w="5240791">
                   <a:extLst>
                     <a:ext uri="{9D8B030D-6E8A-4147-A177-3AD203B41FA5}">
-                      <a16:colId xmlns:a16="http://schemas.microsoft.com/office/drawing/2014/main" val="20001"/>
+                      <a16:colId xmlns:a16="http://schemas.microsoft.com/office/drawing/2014/main" xmlns="" val="20001"/>
                     </a:ext>
                   </a:extLst>
                 </a:gridCol>
@@ -3118,6 +3118,15 @@
                         <a:rPr lang="en-US" altLang="ko-KR" dirty="0"/>
                         <a:t>[25][12] </a:t>
                       </a:r>
+                      <a:endParaRPr lang="en-US" altLang="ko-KR" dirty="0" smtClean="0"/>
+                    </a:p>
+                    <a:p>
+                      <a:pPr latinLnBrk="1"/>
+                      <a:endParaRPr lang="en-US" altLang="ko-KR" smtClean="0"/>
+                    </a:p>
+                    <a:p>
+                      <a:pPr latinLnBrk="1"/>
+                      <a:endParaRPr lang="en-US" altLang="ko-KR" dirty="0"/>
                     </a:p>
                     <a:p>
                       <a:pPr latinLnBrk="1"/>
@@ -3151,7 +3160,7 @@
                 </a:tc>
                 <a:extLst>
                   <a:ext uri="{0D108BD9-81ED-4DB2-BD59-A6C34878D82A}">
-                    <a16:rowId xmlns:a16="http://schemas.microsoft.com/office/drawing/2014/main" val="10000"/>
+                    <a16:rowId xmlns:a16="http://schemas.microsoft.com/office/drawing/2014/main" xmlns="" val="10000"/>
                   </a:ext>
                 </a:extLst>
               </a:tr>
@@ -3382,7 +3391,7 @@
                 </a:tc>
                 <a:extLst>
                   <a:ext uri="{0D108BD9-81ED-4DB2-BD59-A6C34878D82A}">
-                    <a16:rowId xmlns:a16="http://schemas.microsoft.com/office/drawing/2014/main" val="10001"/>
+                    <a16:rowId xmlns:a16="http://schemas.microsoft.com/office/drawing/2014/main" xmlns="" val="10001"/>
                   </a:ext>
                 </a:extLst>
               </a:tr>
@@ -3425,7 +3434,7 @@
           <p:cNvPr id="1026" name="Picture 2" descr="게임제작개론 : #6 게임 시스템 구조에 대한 이해">
             <a:extLst>
               <a:ext uri="{FF2B5EF4-FFF2-40B4-BE49-F238E27FC236}">
-                <a16:creationId xmlns:a16="http://schemas.microsoft.com/office/drawing/2014/main" id="{5AA2E3DF-9B1B-42F8-87D8-4867D943D1DD}"/>
+                <a16:creationId xmlns:a16="http://schemas.microsoft.com/office/drawing/2014/main" xmlns="" id="{5AA2E3DF-9B1B-42F8-87D8-4867D943D1DD}"/>
               </a:ext>
             </a:extLst>
           </p:cNvPr>
@@ -6724,7 +6733,7 @@
   <a:extraClrSchemeLst/>
   <a:extLst>
     <a:ext uri="{05A4C25C-085E-4340-85A3-A5531E510DB2}">
-      <thm15:themeFamily xmlns:thm15="http://schemas.microsoft.com/office/thememl/2012/main" name="Office Theme" id="{62F939B6-93AF-4DB8-9C6B-D6C7DFDC589F}" vid="{4A3C46E8-61CC-4603-A589-7422A47A8E4A}"/>
+      <thm15:themeFamily xmlns:thm15="http://schemas.microsoft.com/office/thememl/2012/main" xmlns="" name="Office Theme" id="{62F939B6-93AF-4DB8-9C6B-D6C7DFDC589F}" vid="{4A3C46E8-61CC-4603-A589-7422A47A8E4A}"/>
     </a:ext>
   </a:extLst>
 </a:theme>

</xml_diff>

<commit_message>
[save] add function interboard(intergrated boards), now build simulation_sub/pushboard()
</commit_message>
<xml_diff>
--- a/TETRIS_NEW_S/Plan.pptx
+++ b/TETRIS_NEW_S/Plan.pptx
@@ -110,7 +110,7 @@
   </p:defaultTextStyle>
   <p:extLst>
     <p:ext uri="{EFAFB233-063F-42B5-8137-9DF3F51BA10A}">
-      <p15:sldGuideLst xmlns:p15="http://schemas.microsoft.com/office/powerpoint/2012/main" xmlns="">
+      <p15:sldGuideLst xmlns="" xmlns:p15="http://schemas.microsoft.com/office/powerpoint/2012/main">
         <p15:guide id="1" orient="horz" pos="3401">
           <p15:clr>
             <a:srgbClr val="A4A3A4"/>
@@ -2995,7 +2995,7 @@
           <p:nvPr>
             <p:extLst>
               <p:ext uri="{D42A27DB-BD31-4B8C-83A1-F6EECF244321}">
-                <p14:modId xmlns:p14="http://schemas.microsoft.com/office/powerpoint/2010/main" val="1659111975"/>
+                <p14:modId xmlns:p14="http://schemas.microsoft.com/office/powerpoint/2010/main" val="4009151229"/>
               </p:ext>
             </p:extLst>
           </p:nvPr>
@@ -3014,14 +3014,14 @@
                 <a:gridCol w="5558973">
                   <a:extLst>
                     <a:ext uri="{9D8B030D-6E8A-4147-A177-3AD203B41FA5}">
-                      <a16:colId xmlns:a16="http://schemas.microsoft.com/office/drawing/2014/main" xmlns="" val="20000"/>
+                      <a16:colId xmlns="" xmlns:a16="http://schemas.microsoft.com/office/drawing/2014/main" val="20000"/>
                     </a:ext>
                   </a:extLst>
                 </a:gridCol>
                 <a:gridCol w="5240791">
                   <a:extLst>
                     <a:ext uri="{9D8B030D-6E8A-4147-A177-3AD203B41FA5}">
-                      <a16:colId xmlns:a16="http://schemas.microsoft.com/office/drawing/2014/main" xmlns="" val="20001"/>
+                      <a16:colId xmlns="" xmlns:a16="http://schemas.microsoft.com/office/drawing/2014/main" val="20001"/>
                     </a:ext>
                   </a:extLst>
                 </a:gridCol>
@@ -3138,6 +3138,70 @@
                     </a:p>
                     <a:p>
                       <a:pPr latinLnBrk="1"/>
+                      <a:r>
+                        <a:rPr lang="en-US" altLang="ko-KR" dirty="0" smtClean="0"/>
+                        <a:t>--</a:t>
+                      </a:r>
+                      <a:r>
+                        <a:rPr lang="ko-KR" altLang="en-US" dirty="0" smtClean="0"/>
+                        <a:t>에러정리</a:t>
+                      </a:r>
+                      <a:endParaRPr lang="en-US" altLang="ko-KR" dirty="0" smtClean="0"/>
+                    </a:p>
+                    <a:p>
+                      <a:pPr latinLnBrk="1"/>
+                      <a:r>
+                        <a:rPr lang="ko-KR" altLang="en-US" dirty="0" smtClean="0"/>
+                        <a:t>보드 맨 밑줄은 충돌확인용으로</a:t>
+                      </a:r>
+                      <a:r>
+                        <a:rPr lang="en-US" altLang="ko-KR" dirty="0" smtClean="0"/>
+                        <a:t>,2</a:t>
+                      </a:r>
+                      <a:r>
+                        <a:rPr lang="ko-KR" altLang="en-US" dirty="0" smtClean="0"/>
+                        <a:t>로 </a:t>
+                      </a:r>
+                      <a:r>
+                        <a:rPr lang="ko-KR" altLang="en-US" dirty="0" err="1" smtClean="0"/>
+                        <a:t>채워져있음</a:t>
+                      </a:r>
+                      <a:r>
+                        <a:rPr lang="ko-KR" altLang="en-US" dirty="0" smtClean="0"/>
+                        <a:t> 출력이 </a:t>
+                      </a:r>
+                      <a:r>
+                        <a:rPr lang="ko-KR" altLang="en-US" dirty="0" err="1" smtClean="0"/>
+                        <a:t>안돼면</a:t>
+                      </a:r>
+                      <a:r>
+                        <a:rPr lang="ko-KR" altLang="en-US" dirty="0" smtClean="0"/>
+                        <a:t> </a:t>
+                      </a:r>
+                      <a:r>
+                        <a:rPr lang="en-US" altLang="ko-KR" dirty="0" err="1" smtClean="0"/>
+                        <a:t>init,boardreset</a:t>
+                      </a:r>
+                      <a:r>
+                        <a:rPr lang="en-US" altLang="ko-KR" dirty="0" smtClean="0"/>
+                        <a:t> </a:t>
+                      </a:r>
+                      <a:r>
+                        <a:rPr lang="ko-KR" altLang="en-US" dirty="0" smtClean="0"/>
+                        <a:t>에 </a:t>
+                      </a:r>
+                      <a:r>
+                        <a:rPr lang="en-US" altLang="ko-KR" dirty="0" smtClean="0"/>
+                        <a:t>24</a:t>
+                      </a:r>
+                      <a:r>
+                        <a:rPr lang="en-US" altLang="ko-KR" baseline="0" dirty="0" smtClean="0"/>
+                        <a:t> </a:t>
+                      </a:r>
+                      <a:r>
+                        <a:rPr lang="ko-KR" altLang="en-US" baseline="0" dirty="0" smtClean="0"/>
+                        <a:t>가 잘 들어갔는지 확인</a:t>
+                      </a:r>
                       <a:endParaRPr lang="en-US" altLang="ko-KR" dirty="0"/>
                     </a:p>
                     <a:p>
@@ -3160,7 +3224,7 @@
                 </a:tc>
                 <a:extLst>
                   <a:ext uri="{0D108BD9-81ED-4DB2-BD59-A6C34878D82A}">
-                    <a16:rowId xmlns:a16="http://schemas.microsoft.com/office/drawing/2014/main" xmlns="" val="10000"/>
+                    <a16:rowId xmlns="" xmlns:a16="http://schemas.microsoft.com/office/drawing/2014/main" val="10000"/>
                   </a:ext>
                 </a:extLst>
               </a:tr>
@@ -3176,49 +3240,77 @@
                         <a:t>현재 완료</a:t>
                       </a:r>
                       <a:r>
-                        <a:rPr lang="en-US" altLang="ko-KR" dirty="0"/>
+                        <a:rPr lang="en-US" altLang="ko-KR" dirty="0" smtClean="0"/>
                         <a:t>:</a:t>
                       </a:r>
                     </a:p>
                     <a:p>
                       <a:pPr latinLnBrk="1"/>
                       <a:r>
-                        <a:rPr lang="en-US" altLang="ko-KR" dirty="0"/>
-                        <a:t>input(int *key): key</a:t>
-                      </a:r>
-                      <a:r>
-                        <a:rPr lang="ko-KR" altLang="en-US" dirty="0"/>
-                        <a:t>가 반환될 </a:t>
-                      </a:r>
-                      <a:r>
-                        <a:rPr lang="en-US" altLang="ko-KR" dirty="0"/>
-                        <a:t>int </a:t>
-                      </a:r>
-                      <a:r>
-                        <a:rPr lang="ko-KR" altLang="en-US" dirty="0"/>
-                        <a:t>주소 받기</a:t>
-                      </a:r>
-                      <a:r>
-                        <a:rPr lang="en-US" altLang="ko-KR" dirty="0"/>
-                        <a:t>,0.1</a:t>
-                      </a:r>
-                      <a:r>
-                        <a:rPr lang="ko-KR" altLang="en-US" dirty="0"/>
-                        <a:t>초마다 키 입력 </a:t>
-                      </a:r>
-                      <a:r>
-                        <a:rPr lang="en-US" altLang="ko-KR" dirty="0"/>
-                        <a:t>*</a:t>
-                      </a:r>
-                      <a:r>
-                        <a:rPr lang="ko-KR" altLang="en-US" dirty="0"/>
-                        <a:t>구현완료</a:t>
-                      </a:r>
-                      <a:r>
-                        <a:rPr lang="en-US" altLang="ko-KR" dirty="0"/>
-                        <a:t>*</a:t>
-                      </a:r>
-                      <a:endParaRPr lang="ko-KR" altLang="en-US" dirty="0"/>
+                        <a:rPr lang="en-US" altLang="ko-KR" dirty="0" smtClean="0"/>
+                        <a:t>System</a:t>
+                      </a:r>
+                      <a:r>
+                        <a:rPr lang="ko-KR" altLang="en-US" dirty="0" smtClean="0"/>
+                        <a:t>에서 </a:t>
+                      </a:r>
+                      <a:r>
+                        <a:rPr lang="en-US" altLang="ko-KR" dirty="0" smtClean="0"/>
+                        <a:t>key</a:t>
+                      </a:r>
+                      <a:r>
+                        <a:rPr lang="ko-KR" altLang="en-US" dirty="0" smtClean="0"/>
+                        <a:t>를 넘겨 </a:t>
+                      </a:r>
+                      <a:r>
+                        <a:rPr lang="ko-KR" altLang="en-US" baseline="0" dirty="0" smtClean="0"/>
+                        <a:t> </a:t>
+                      </a:r>
+                      <a:r>
+                        <a:rPr lang="ko-KR" altLang="en-US" baseline="0" dirty="0" err="1" smtClean="0"/>
+                        <a:t>입력값</a:t>
+                      </a:r>
+                      <a:r>
+                        <a:rPr lang="ko-KR" altLang="en-US" baseline="0" dirty="0" smtClean="0"/>
+                        <a:t> 사용가능</a:t>
+                      </a:r>
+                      <a:endParaRPr lang="en-US" altLang="ko-KR" baseline="0" dirty="0" smtClean="0"/>
+                    </a:p>
+                    <a:p>
+                      <a:pPr latinLnBrk="1"/>
+                      <a:endParaRPr lang="en-US" altLang="ko-KR" baseline="0" dirty="0" smtClean="0"/>
+                    </a:p>
+                    <a:p>
+                      <a:pPr latinLnBrk="1"/>
+                      <a:r>
+                        <a:rPr lang="en-US" altLang="ko-KR" dirty="0" err="1" smtClean="0"/>
+                        <a:t>Interboard</a:t>
+                      </a:r>
+                      <a:r>
+                        <a:rPr lang="en-US" altLang="ko-KR" baseline="0" dirty="0" smtClean="0"/>
+                        <a:t> </a:t>
+                      </a:r>
+                      <a:r>
+                        <a:rPr lang="ko-KR" altLang="en-US" baseline="0" dirty="0" smtClean="0"/>
+                        <a:t>테스트 안됨</a:t>
+                      </a:r>
+                      <a:endParaRPr lang="en-US" altLang="ko-KR" baseline="0" dirty="0" smtClean="0"/>
+                    </a:p>
+                    <a:p>
+                      <a:pPr latinLnBrk="1"/>
+                      <a:r>
+                        <a:rPr lang="en-US" altLang="ko-KR" baseline="0" dirty="0" smtClean="0"/>
+                        <a:t>(board </a:t>
+                      </a:r>
+                      <a:r>
+                        <a:rPr lang="ko-KR" altLang="en-US" baseline="0" dirty="0" smtClean="0"/>
+                        <a:t>합성</a:t>
+                      </a:r>
+                      <a:r>
+                        <a:rPr lang="en-US" altLang="ko-KR" baseline="0" dirty="0" smtClean="0"/>
+                        <a:t>)</a:t>
+                      </a:r>
+                      <a:endParaRPr lang="en-US" altLang="ko-KR" dirty="0"/>
                     </a:p>
                   </a:txBody>
                   <a:tcPr/>
@@ -3242,7 +3334,103 @@
                       <a:pPr latinLnBrk="1"/>
                       <a:r>
                         <a:rPr lang="ko-KR" altLang="en-US" dirty="0"/>
-                        <a:t>블록이 떨어지는 기본 프로토타입 만들기</a:t>
+                        <a:t>블록이 떨어지는 기본 </a:t>
+                      </a:r>
+                      <a:r>
+                        <a:rPr lang="ko-KR" altLang="en-US" dirty="0" err="1"/>
+                        <a:t>프로토타입</a:t>
+                      </a:r>
+                      <a:r>
+                        <a:rPr lang="ko-KR" altLang="en-US" dirty="0"/>
+                        <a:t> </a:t>
+                      </a:r>
+                      <a:r>
+                        <a:rPr lang="ko-KR" altLang="en-US" dirty="0" smtClean="0"/>
+                        <a:t>만들기</a:t>
+                      </a:r>
+                      <a:endParaRPr lang="en-US" altLang="ko-KR" dirty="0" smtClean="0"/>
+                    </a:p>
+                    <a:p>
+                      <a:pPr latinLnBrk="1"/>
+                      <a:r>
+                        <a:rPr lang="en-US" altLang="ko-KR" u="sng" dirty="0" err="1" smtClean="0">
+                          <a:solidFill>
+                            <a:srgbClr val="FF0000"/>
+                          </a:solidFill>
+                        </a:rPr>
+                        <a:t>simulation_sub</a:t>
+                      </a:r>
+                      <a:r>
+                        <a:rPr lang="en-US" altLang="ko-KR" u="sng" dirty="0" smtClean="0">
+                          <a:solidFill>
+                            <a:srgbClr val="FF0000"/>
+                          </a:solidFill>
+                        </a:rPr>
+                        <a:t>/</a:t>
+                      </a:r>
+                      <a:r>
+                        <a:rPr lang="en-US" altLang="ko-KR" u="sng" dirty="0" err="1" smtClean="0">
+                          <a:solidFill>
+                            <a:srgbClr val="FF0000"/>
+                          </a:solidFill>
+                        </a:rPr>
+                        <a:t>pushboard</a:t>
+                      </a:r>
+                      <a:r>
+                        <a:rPr lang="en-US" altLang="ko-KR" u="sng" dirty="0" smtClean="0">
+                          <a:solidFill>
+                            <a:srgbClr val="FF0000"/>
+                          </a:solidFill>
+                        </a:rPr>
+                        <a:t>()</a:t>
+                      </a:r>
+                      <a:r>
+                        <a:rPr lang="en-US" altLang="ko-KR" u="sng" baseline="0" dirty="0" smtClean="0">
+                          <a:solidFill>
+                            <a:srgbClr val="FF0000"/>
+                          </a:solidFill>
+                        </a:rPr>
+                        <a:t> </a:t>
+                      </a:r>
+                      <a:r>
+                        <a:rPr lang="ko-KR" altLang="en-US" u="sng" baseline="0" dirty="0" err="1" smtClean="0">
+                          <a:solidFill>
+                            <a:srgbClr val="FF0000"/>
+                          </a:solidFill>
+                        </a:rPr>
+                        <a:t>개발중</a:t>
+                      </a:r>
+                      <a:endParaRPr lang="en-US" altLang="ko-KR" u="sng" dirty="0">
+                        <a:solidFill>
+                          <a:srgbClr val="FF0000"/>
+                        </a:solidFill>
+                      </a:endParaRPr>
+                    </a:p>
+                    <a:p>
+                      <a:pPr latinLnBrk="1"/>
+                      <a:endParaRPr lang="en-US" altLang="ko-KR" dirty="0"/>
+                    </a:p>
+                    <a:p>
+                      <a:pPr latinLnBrk="1"/>
+                      <a:r>
+                        <a:rPr lang="en-US" altLang="ko-KR" dirty="0"/>
+                        <a:t>1:</a:t>
+                      </a:r>
+                      <a:r>
+                        <a:rPr lang="ko-KR" altLang="en-US" dirty="0"/>
+                        <a:t>매커니즘 구현</a:t>
+                      </a:r>
+                      <a:endParaRPr lang="en-US" altLang="ko-KR" dirty="0"/>
+                    </a:p>
+                    <a:p>
+                      <a:pPr latinLnBrk="1"/>
+                      <a:r>
+                        <a:rPr lang="en-US" altLang="ko-KR" dirty="0"/>
+                        <a:t>  (1):gamesystem </a:t>
+                      </a:r>
+                      <a:r>
+                        <a:rPr lang="ko-KR" altLang="en-US" dirty="0"/>
+                        <a:t>라이브러리 구현</a:t>
                       </a:r>
                       <a:endParaRPr lang="en-US" altLang="ko-KR" dirty="0"/>
                     </a:p>
@@ -3254,34 +3442,6 @@
                       <a:pPr latinLnBrk="1"/>
                       <a:r>
                         <a:rPr lang="en-US" altLang="ko-KR" dirty="0"/>
-                        <a:t>1:</a:t>
-                      </a:r>
-                      <a:r>
-                        <a:rPr lang="ko-KR" altLang="en-US" dirty="0"/>
-                        <a:t>매커니즘 구현</a:t>
-                      </a:r>
-                      <a:endParaRPr lang="en-US" altLang="ko-KR" dirty="0"/>
-                    </a:p>
-                    <a:p>
-                      <a:pPr latinLnBrk="1"/>
-                      <a:r>
-                        <a:rPr lang="en-US" altLang="ko-KR" dirty="0"/>
-                        <a:t>  (1):gamesystem </a:t>
-                      </a:r>
-                      <a:r>
-                        <a:rPr lang="ko-KR" altLang="en-US" dirty="0"/>
-                        <a:t>라이브러리 구현</a:t>
-                      </a:r>
-                      <a:endParaRPr lang="en-US" altLang="ko-KR" dirty="0"/>
-                    </a:p>
-                    <a:p>
-                      <a:pPr latinLnBrk="1"/>
-                      <a:endParaRPr lang="en-US" altLang="ko-KR" dirty="0"/>
-                    </a:p>
-                    <a:p>
-                      <a:pPr latinLnBrk="1"/>
-                      <a:r>
-                        <a:rPr lang="en-US" altLang="ko-KR" dirty="0"/>
                         <a:t>2:</a:t>
                       </a:r>
                       <a:r>
@@ -3363,7 +3523,7 @@
                 </a:tc>
                 <a:extLst>
                   <a:ext uri="{0D108BD9-81ED-4DB2-BD59-A6C34878D82A}">
-                    <a16:rowId xmlns:a16="http://schemas.microsoft.com/office/drawing/2014/main" xmlns="" val="10001"/>
+                    <a16:rowId xmlns="" xmlns:a16="http://schemas.microsoft.com/office/drawing/2014/main" val="10001"/>
                   </a:ext>
                 </a:extLst>
               </a:tr>
@@ -3406,7 +3566,7 @@
           <p:cNvPr id="1026" name="Picture 2" descr="게임제작개론 : #6 게임 시스템 구조에 대한 이해">
             <a:extLst>
               <a:ext uri="{FF2B5EF4-FFF2-40B4-BE49-F238E27FC236}">
-                <a16:creationId xmlns:a16="http://schemas.microsoft.com/office/drawing/2014/main" xmlns="" id="{5AA2E3DF-9B1B-42F8-87D8-4867D943D1DD}"/>
+                <a16:creationId xmlns="" xmlns:a16="http://schemas.microsoft.com/office/drawing/2014/main" id="{5AA2E3DF-9B1B-42F8-87D8-4867D943D1DD}"/>
               </a:ext>
             </a:extLst>
           </p:cNvPr>
@@ -6705,7 +6865,7 @@
   <a:extraClrSchemeLst/>
   <a:extLst>
     <a:ext uri="{05A4C25C-085E-4340-85A3-A5531E510DB2}">
-      <thm15:themeFamily xmlns:thm15="http://schemas.microsoft.com/office/thememl/2012/main" xmlns="" name="Office Theme" id="{62F939B6-93AF-4DB8-9C6B-D6C7DFDC589F}" vid="{4A3C46E8-61CC-4603-A589-7422A47A8E4A}"/>
+      <thm15:themeFamily xmlns="" xmlns:thm15="http://schemas.microsoft.com/office/thememl/2012/main" name="Office Theme" id="{62F939B6-93AF-4DB8-9C6B-D6C7DFDC589F}" vid="{4A3C46E8-61CC-4603-A589-7422A47A8E4A}"/>
     </a:ext>
   </a:extLst>
 </a:theme>

</xml_diff>